<commit_message>
specified optional sim to sim and corrected a typo
</commit_message>
<xml_diff>
--- a/AxDelTest.pptx
+++ b/AxDelTest.pptx
@@ -104,6 +104,11 @@
       </a:defRPr>
     </a:lvl9pPr>
   </p:defaultTextStyle>
+  <p:extLst>
+    <p:ext uri="{EFAFB233-063F-42B5-8137-9DF3F51BA10A}">
+      <p15:sldGuideLst xmlns:p15="http://schemas.microsoft.com/office/powerpoint/2012/main"/>
+    </p:ext>
+  </p:extLst>
 </p:presentation>
 </file>
 
@@ -3199,47 +3204,83 @@
           <a:lstStyle/>
           <a:p>
             <a:r>
-              <a:rPr lang="en-GB" dirty="0"/>
+              <a:rPr lang="en-GB" dirty="0">
+                <a:solidFill>
+                  <a:schemeClr val="accent6"/>
+                </a:solidFill>
+              </a:rPr>
               <a:t>C</a:t>
             </a:r>
             <a:r>
-              <a:rPr lang="en-IT" dirty="0"/>
+              <a:rPr lang="en-IT" dirty="0">
+                <a:solidFill>
+                  <a:schemeClr val="accent6"/>
+                </a:solidFill>
+              </a:rPr>
               <a:t>omparison</a:t>
             </a:r>
           </a:p>
           <a:p>
             <a:r>
-              <a:rPr lang="en-GB" dirty="0"/>
+              <a:rPr lang="en-GB" dirty="0">
+                <a:solidFill>
+                  <a:schemeClr val="accent6"/>
+                </a:solidFill>
+              </a:rPr>
               <a:t>s</a:t>
             </a:r>
             <a:r>
-              <a:rPr lang="en-IT" dirty="0"/>
+              <a:rPr lang="en-IT" dirty="0">
+                <a:solidFill>
+                  <a:schemeClr val="accent6"/>
+                </a:solidFill>
+              </a:rPr>
               <a:t>hould signal</a:t>
             </a:r>
           </a:p>
           <a:p>
             <a:r>
-              <a:rPr lang="en-GB" dirty="0"/>
+              <a:rPr lang="en-GB" dirty="0">
+                <a:solidFill>
+                  <a:schemeClr val="accent6"/>
+                </a:solidFill>
+              </a:rPr>
               <a:t>n</a:t>
             </a:r>
             <a:r>
-              <a:rPr lang="en-IT" dirty="0"/>
+              <a:rPr lang="en-IT" dirty="0">
+                <a:solidFill>
+                  <a:schemeClr val="accent6"/>
+                </a:solidFill>
+              </a:rPr>
               <a:t>o differences</a:t>
             </a:r>
           </a:p>
           <a:p>
             <a:r>
-              <a:rPr lang="en-GB" dirty="0"/>
+              <a:rPr lang="en-GB" dirty="0">
+                <a:solidFill>
+                  <a:schemeClr val="accent6"/>
+                </a:solidFill>
+              </a:rPr>
               <a:t>I</a:t>
             </a:r>
             <a:r>
-              <a:rPr lang="en-IT" dirty="0"/>
+              <a:rPr lang="en-IT" dirty="0">
+                <a:solidFill>
+                  <a:schemeClr val="accent6"/>
+                </a:solidFill>
+              </a:rPr>
               <a:t>n final synaptic</a:t>
             </a:r>
           </a:p>
           <a:p>
             <a:r>
-              <a:rPr lang="en-IT" dirty="0"/>
+              <a:rPr lang="en-IT" dirty="0">
+                <a:solidFill>
+                  <a:schemeClr val="accent6"/>
+                </a:solidFill>
+              </a:rPr>
               <a:t>weights</a:t>
             </a:r>
           </a:p>
@@ -3469,47 +3510,83 @@
           <a:lstStyle/>
           <a:p>
             <a:r>
-              <a:rPr lang="en-GB" dirty="0"/>
+              <a:rPr lang="en-GB" dirty="0">
+                <a:solidFill>
+                  <a:srgbClr val="FF0000"/>
+                </a:solidFill>
+              </a:rPr>
               <a:t>C</a:t>
             </a:r>
             <a:r>
-              <a:rPr lang="en-IT" dirty="0"/>
+              <a:rPr lang="en-IT" dirty="0">
+                <a:solidFill>
+                  <a:srgbClr val="FF0000"/>
+                </a:solidFill>
+              </a:rPr>
               <a:t>omparison</a:t>
             </a:r>
           </a:p>
           <a:p>
             <a:r>
-              <a:rPr lang="en-GB" dirty="0"/>
+              <a:rPr lang="en-GB" dirty="0">
+                <a:solidFill>
+                  <a:srgbClr val="FF0000"/>
+                </a:solidFill>
+              </a:rPr>
               <a:t>s</a:t>
             </a:r>
             <a:r>
-              <a:rPr lang="en-IT" dirty="0"/>
+              <a:rPr lang="en-IT" dirty="0">
+                <a:solidFill>
+                  <a:srgbClr val="FF0000"/>
+                </a:solidFill>
+              </a:rPr>
               <a:t>hould signal</a:t>
             </a:r>
           </a:p>
           <a:p>
             <a:r>
-              <a:rPr lang="en-GB" dirty="0"/>
+              <a:rPr lang="en-GB" dirty="0">
+                <a:solidFill>
+                  <a:srgbClr val="FF0000"/>
+                </a:solidFill>
+              </a:rPr>
               <a:t>n</a:t>
             </a:r>
             <a:r>
-              <a:rPr lang="en-IT" dirty="0"/>
+              <a:rPr lang="en-IT" dirty="0">
+                <a:solidFill>
+                  <a:srgbClr val="FF0000"/>
+                </a:solidFill>
+              </a:rPr>
               <a:t>o differences</a:t>
             </a:r>
           </a:p>
           <a:p>
             <a:r>
-              <a:rPr lang="en-GB" dirty="0"/>
+              <a:rPr lang="en-GB" dirty="0">
+                <a:solidFill>
+                  <a:srgbClr val="FF0000"/>
+                </a:solidFill>
+              </a:rPr>
               <a:t>I</a:t>
             </a:r>
             <a:r>
-              <a:rPr lang="en-IT" dirty="0"/>
+              <a:rPr lang="en-IT" dirty="0">
+                <a:solidFill>
+                  <a:srgbClr val="FF0000"/>
+                </a:solidFill>
+              </a:rPr>
               <a:t>n final synaptic</a:t>
             </a:r>
           </a:p>
           <a:p>
             <a:r>
-              <a:rPr lang="en-IT" dirty="0"/>
+              <a:rPr lang="en-IT" dirty="0">
+                <a:solidFill>
+                  <a:srgbClr val="FF0000"/>
+                </a:solidFill>
+              </a:rPr>
               <a:t>weights</a:t>
             </a:r>
           </a:p>
@@ -3540,6 +3617,7 @@
             <a:avLst/>
           </a:prstGeom>
           <a:ln w="53975">
+            <a:prstDash val="sysDot"/>
             <a:headEnd type="triangle"/>
             <a:tailEnd type="triangle"/>
           </a:ln>
@@ -3574,7 +3652,7 @@
         <p:spPr>
           <a:xfrm>
             <a:off x="4082226" y="1528270"/>
-            <a:ext cx="2009166" cy="1477328"/>
+            <a:ext cx="2009166" cy="1754326"/>
           </a:xfrm>
           <a:prstGeom prst="rect">
             <a:avLst/>
@@ -3588,47 +3666,83 @@
           <a:lstStyle/>
           <a:p>
             <a:r>
-              <a:rPr lang="en-GB" dirty="0"/>
-              <a:t>C</a:t>
-            </a:r>
-            <a:r>
-              <a:rPr lang="en-IT" dirty="0"/>
+              <a:rPr lang="en-GB" dirty="0">
+                <a:solidFill>
+                  <a:schemeClr val="accent1"/>
+                </a:solidFill>
+              </a:rPr>
+              <a:t>(optional) C</a:t>
+            </a:r>
+            <a:r>
+              <a:rPr lang="en-IT" dirty="0">
+                <a:solidFill>
+                  <a:schemeClr val="accent1"/>
+                </a:solidFill>
+              </a:rPr>
               <a:t>omparison</a:t>
             </a:r>
           </a:p>
           <a:p>
             <a:r>
-              <a:rPr lang="en-GB" dirty="0"/>
+              <a:rPr lang="en-GB" dirty="0">
+                <a:solidFill>
+                  <a:schemeClr val="accent1"/>
+                </a:solidFill>
+              </a:rPr>
               <a:t>s</a:t>
             </a:r>
             <a:r>
-              <a:rPr lang="en-IT" dirty="0"/>
+              <a:rPr lang="en-IT" dirty="0">
+                <a:solidFill>
+                  <a:schemeClr val="accent1"/>
+                </a:solidFill>
+              </a:rPr>
               <a:t>hould signal</a:t>
             </a:r>
           </a:p>
           <a:p>
             <a:r>
-              <a:rPr lang="en-GB" dirty="0"/>
+              <a:rPr lang="en-GB" dirty="0">
+                <a:solidFill>
+                  <a:schemeClr val="accent1"/>
+                </a:solidFill>
+              </a:rPr>
               <a:t>n</a:t>
             </a:r>
             <a:r>
-              <a:rPr lang="en-IT" dirty="0"/>
+              <a:rPr lang="en-IT" dirty="0">
+                <a:solidFill>
+                  <a:schemeClr val="accent1"/>
+                </a:solidFill>
+              </a:rPr>
               <a:t>o differences</a:t>
             </a:r>
           </a:p>
           <a:p>
             <a:r>
-              <a:rPr lang="en-GB" dirty="0"/>
+              <a:rPr lang="en-GB" dirty="0">
+                <a:solidFill>
+                  <a:schemeClr val="accent1"/>
+                </a:solidFill>
+              </a:rPr>
               <a:t>I</a:t>
             </a:r>
             <a:r>
-              <a:rPr lang="en-IT" dirty="0"/>
+              <a:rPr lang="en-IT" dirty="0">
+                <a:solidFill>
+                  <a:schemeClr val="accent1"/>
+                </a:solidFill>
+              </a:rPr>
               <a:t>n final synaptic</a:t>
             </a:r>
           </a:p>
           <a:p>
             <a:r>
-              <a:rPr lang="en-IT" dirty="0"/>
+              <a:rPr lang="en-IT" dirty="0">
+                <a:solidFill>
+                  <a:schemeClr val="accent1"/>
+                </a:solidFill>
+              </a:rPr>
               <a:t>weights</a:t>
             </a:r>
           </a:p>
@@ -3690,7 +3804,7 @@
         </p:nvSpPr>
         <p:spPr>
           <a:xfrm>
-            <a:off x="1879353" y="3187540"/>
+            <a:off x="1997130" y="3629129"/>
             <a:ext cx="2171685" cy="369332"/>
           </a:xfrm>
           <a:prstGeom prst="rect">
@@ -3729,8 +3843,8 @@
         </p:nvSpPr>
         <p:spPr>
           <a:xfrm>
-            <a:off x="5629547" y="3080140"/>
-            <a:ext cx="2171685" cy="369332"/>
+            <a:off x="5086809" y="3609536"/>
+            <a:ext cx="2771977" cy="369332"/>
           </a:xfrm>
           <a:prstGeom prst="rect">
             <a:avLst/>
@@ -3749,7 +3863,7 @@
                   <a:srgbClr val="FF0000"/>
                 </a:solidFill>
               </a:rPr>
-              <a:t>AxDsimVSAxDpred</a:t>
+              <a:t>NoAxDsimVSNoAxDpred</a:t>
             </a:r>
           </a:p>
         </p:txBody>

</xml_diff>